<commit_message>
Final Single css file and working perfectly
</commit_message>
<xml_diff>
--- a/POC1.pptx
+++ b/POC1.pptx
@@ -112,6 +112,11 @@
       </a:defRPr>
     </a:lvl9pPr>
   </p:defaultTextStyle>
+  <p:extLst>
+    <p:ext uri="{EFAFB233-063F-42B5-8137-9DF3F51BA10A}">
+      <p15:sldGuideLst xmlns:p15="http://schemas.microsoft.com/office/powerpoint/2012/main"/>
+    </p:ext>
+  </p:extLst>
 </p:presentation>
 </file>
 
@@ -3612,7 +3617,7 @@
                 <a16:creationId xmlns:a16="http://schemas.microsoft.com/office/drawing/2014/main" id="{5B804E9F-B6B5-41F9-9B63-9AF435FDC2B7}"/>
               </a:ext>
               <a:ext uri="{C183D7F6-B498-43B3-948B-1728B52AA6E4}">
-                <adec:decorative xmlns:adec="http://schemas.microsoft.com/office/drawing/2017/decorative" xmlns="" val="1"/>
+                <adec:decorative xmlns="" xmlns:adec="http://schemas.microsoft.com/office/drawing/2017/decorative" val="1"/>
               </a:ext>
             </a:extLst>
           </p:cNvPr>
@@ -3669,7 +3674,7 @@
                 <a16:creationId xmlns:a16="http://schemas.microsoft.com/office/drawing/2014/main" id="{0092C447-C8E1-4B12-B012-E6D21CBB1FBE}"/>
               </a:ext>
               <a:ext uri="{C183D7F6-B498-43B3-948B-1728B52AA6E4}">
-                <adec:decorative xmlns:adec="http://schemas.microsoft.com/office/drawing/2017/decorative" xmlns="" val="1"/>
+                <adec:decorative xmlns="" xmlns:adec="http://schemas.microsoft.com/office/drawing/2017/decorative" val="1"/>
               </a:ext>
             </a:extLst>
           </p:cNvPr>
@@ -3726,7 +3731,7 @@
                 <a16:creationId xmlns:a16="http://schemas.microsoft.com/office/drawing/2014/main" id="{7E139379-1914-4446-8D6D-984A47041A54}"/>
               </a:ext>
               <a:ext uri="{C183D7F6-B498-43B3-948B-1728B52AA6E4}">
-                <adec:decorative xmlns:adec="http://schemas.microsoft.com/office/drawing/2017/decorative" xmlns="" val="1"/>
+                <adec:decorative xmlns="" xmlns:adec="http://schemas.microsoft.com/office/drawing/2017/decorative" val="1"/>
               </a:ext>
             </a:extLst>
           </p:cNvPr>
@@ -3783,7 +3788,7 @@
                 <a16:creationId xmlns:a16="http://schemas.microsoft.com/office/drawing/2014/main" id="{F79B51BB-1B30-4ED8-B26D-21EE8BC675B2}"/>
               </a:ext>
               <a:ext uri="{C183D7F6-B498-43B3-948B-1728B52AA6E4}">
-                <adec:decorative xmlns:adec="http://schemas.microsoft.com/office/drawing/2017/decorative" xmlns="" val="1"/>
+                <adec:decorative xmlns="" xmlns:adec="http://schemas.microsoft.com/office/drawing/2017/decorative" val="1"/>
               </a:ext>
             </a:extLst>
           </p:cNvPr>
@@ -4000,11 +4005,6 @@
               </a:rPr>
               <a:t>FRONT END</a:t>
             </a:r>
-            <a:endParaRPr lang="en-US" sz="1600" b="1" dirty="0" smtClean="0">
-              <a:solidFill>
-                <a:schemeClr val="bg1"/>
-              </a:solidFill>
-            </a:endParaRPr>
           </a:p>
         </p:txBody>
       </p:sp>
@@ -4143,13 +4143,6 @@
               </a:rPr>
               <a:t> Preprocessor </a:t>
             </a:r>
-            <a:endParaRPr lang="en-US" sz="1400" b="1" dirty="0" smtClean="0">
-              <a:solidFill>
-                <a:schemeClr val="bg1"/>
-              </a:solidFill>
-              <a:latin typeface="Arial Black" panose="020B0A04020102020204" pitchFamily="34" charset="0"/>
-              <a:cs typeface="Segoe UI" panose="020B0502040204020203" pitchFamily="34" charset="0"/>
-            </a:endParaRPr>
           </a:p>
         </p:txBody>
       </p:sp>
@@ -4293,17 +4286,7 @@
                 <a:latin typeface="Arial Black" panose="020B0A04020102020204" pitchFamily="34" charset="0"/>
                 <a:cs typeface="Segoe UI" panose="020B0502040204020203" pitchFamily="34" charset="0"/>
               </a:rPr>
-              <a:t>MySQL DB</a:t>
-            </a:r>
-            <a:r>
-              <a:rPr lang="en-US" sz="1400" dirty="0" smtClean="0">
-                <a:solidFill>
-                  <a:schemeClr val="bg1"/>
-                </a:solidFill>
-                <a:latin typeface="Arial Black" panose="020B0A04020102020204" pitchFamily="34" charset="0"/>
-                <a:cs typeface="Segoe UI" panose="020B0502040204020203" pitchFamily="34" charset="0"/>
-              </a:rPr>
-              <a:t> </a:t>
+              <a:t>MySQL DB </a:t>
             </a:r>
           </a:p>
           <a:p>
@@ -14334,16 +14317,16 @@
               <a:buChar char="•"/>
             </a:pPr>
             <a:r>
+              <a:rPr lang="en-US" smtClean="0"/>
+              <a:t>Check </a:t>
+            </a:r>
+            <a:r>
+              <a:rPr lang="en-US" smtClean="0"/>
+              <a:t>Navigation </a:t>
+            </a:r>
+            <a:r>
               <a:rPr lang="en-US" dirty="0" smtClean="0"/>
-              <a:t>Check </a:t>
-            </a:r>
-            <a:r>
-              <a:rPr lang="en-US" dirty="0" err="1" smtClean="0"/>
-              <a:t>Nevigation</a:t>
-            </a:r>
-            <a:r>
-              <a:rPr lang="en-US" dirty="0" smtClean="0"/>
-              <a:t> bar.</a:t>
+              <a:t>bar.</a:t>
             </a:r>
           </a:p>
           <a:p>
@@ -14493,11 +14476,7 @@
             </a:pPr>
             <a:r>
               <a:rPr lang="en-US" dirty="0" smtClean="0"/>
-              <a:t>In DB handler with Unsigned value for negative value</a:t>
-            </a:r>
-            <a:r>
-              <a:rPr lang="en-US" dirty="0" smtClean="0"/>
-              <a:t> </a:t>
+              <a:t>In DB handler with Unsigned value for negative value </a:t>
             </a:r>
           </a:p>
           <a:p>

</xml_diff>